<commit_message>
Add finished docs for final submition
</commit_message>
<xml_diff>
--- a/CheckpointII/CII_G15.pptx
+++ b/CheckpointII/CII_G15.pptx
@@ -5,10 +5,10 @@
     <p:sldMasterId id="2147483648" r:id="rId1"/>
   </p:sldMasterIdLst>
   <p:notesMasterIdLst>
-    <p:notesMasterId r:id="rId25"/>
+    <p:notesMasterId r:id="rId24"/>
   </p:notesMasterIdLst>
   <p:handoutMasterIdLst>
-    <p:handoutMasterId r:id="rId26"/>
+    <p:handoutMasterId r:id="rId25"/>
   </p:handoutMasterIdLst>
   <p:sldIdLst>
     <p:sldId id="256" r:id="rId2"/>
@@ -31,9 +31,8 @@
     <p:sldId id="1103" r:id="rId19"/>
     <p:sldId id="1104" r:id="rId20"/>
     <p:sldId id="1113" r:id="rId21"/>
-    <p:sldId id="1114" r:id="rId22"/>
-    <p:sldId id="1115" r:id="rId23"/>
-    <p:sldId id="1116" r:id="rId24"/>
+    <p:sldId id="1115" r:id="rId22"/>
+    <p:sldId id="1116" r:id="rId23"/>
   </p:sldIdLst>
   <p:sldSz cx="9144000" cy="6858000" type="screen4x3"/>
   <p:notesSz cx="6858000" cy="9144000"/>
@@ -233,7 +232,7 @@
           <a:p>
             <a:fld id="{745C36E7-9E00-462E-80A3-32F2BE615C7A}" type="datetimeFigureOut">
               <a:rPr lang="en-US" smtClean="0"/>
-              <a:t>15-Oct-19</a:t>
+              <a:t>10/15/2019</a:t>
             </a:fld>
             <a:endParaRPr lang="en-US"/>
           </a:p>
@@ -399,7 +398,7 @@
             <a:fld id="{01F3E309-ED8D-4193-99AF-E5EA90965E98}" type="datetimeFigureOut">
               <a:rPr lang="en-US" smtClean="0"/>
               <a:pPr/>
-              <a:t>15-Oct-19</a:t>
+              <a:t>10/15/2019</a:t>
             </a:fld>
             <a:endParaRPr lang="en-US"/>
           </a:p>
@@ -4326,7 +4325,7 @@
             <a:pPr lvl="1"/>
             <a:r>
               <a:rPr lang="en-US" sz="2500" b="1" dirty="0"/>
-              <a:t>	“Value”		: Ratio</a:t>
+              <a:t>	“Value”		: Ratio/Continuous</a:t>
             </a:r>
           </a:p>
           <a:p>
@@ -4440,7 +4439,10 @@
           <a:bodyPr/>
           <a:lstStyle/>
           <a:p>
-            <a:endParaRPr lang="en-US"/>
+            <a:r>
+              <a:rPr lang="en-US" dirty="0"/>
+              <a:t>Data abstraction</a:t>
+            </a:r>
           </a:p>
         </p:txBody>
       </p:sp>
@@ -4594,7 +4596,10 @@
           <a:bodyPr/>
           <a:lstStyle/>
           <a:p>
-            <a:endParaRPr lang="en-US"/>
+            <a:r>
+              <a:rPr lang="en-US" dirty="0"/>
+              <a:t>Data abstraction</a:t>
+            </a:r>
           </a:p>
         </p:txBody>
       </p:sp>
@@ -4761,6 +4766,17 @@
             </a:r>
           </a:p>
           <a:p>
+            <a:pPr marL="0" indent="0"/>
+            <a:r>
+              <a:rPr lang="en-US" sz="2500" b="0" dirty="0">
+                <a:solidFill>
+                  <a:schemeClr val="tx1"/>
+                </a:solidFill>
+              </a:rPr>
+              <a:t>         - Total , Males, Females</a:t>
+            </a:r>
+          </a:p>
+          <a:p>
             <a:pPr marL="571500" indent="-571500">
               <a:buFont typeface="Arial" panose="020B0604020202020204" pitchFamily="34" charset="0"/>
               <a:buChar char="•"/>
@@ -4803,6 +4819,17 @@
             </a:r>
           </a:p>
           <a:p>
+            <a:pPr marL="0" indent="0"/>
+            <a:r>
+              <a:rPr lang="en-US" sz="2500" b="0" dirty="0">
+                <a:solidFill>
+                  <a:schemeClr val="tx1"/>
+                </a:solidFill>
+              </a:rPr>
+              <a:t>          - (Minutes, Percentages, Salaries)</a:t>
+            </a:r>
+          </a:p>
+          <a:p>
             <a:pPr marL="571500" indent="-571500">
               <a:buFont typeface="Arial" panose="020B0604020202020204" pitchFamily="34" charset="0"/>
               <a:buChar char="•"/>
@@ -4819,6 +4846,17 @@
               </a:rPr>
               <a:t>– it describes a country</a:t>
             </a:r>
+          </a:p>
+          <a:p>
+            <a:pPr marL="571500" indent="-571500">
+              <a:buFont typeface="Arial" panose="020B0604020202020204" pitchFamily="34" charset="0"/>
+              <a:buChar char="•"/>
+            </a:pPr>
+            <a:endParaRPr lang="en-US" sz="2500" b="0" dirty="0">
+              <a:solidFill>
+                <a:schemeClr val="tx1"/>
+              </a:solidFill>
+            </a:endParaRPr>
           </a:p>
         </p:txBody>
       </p:sp>
@@ -5215,8 +5253,8 @@
         </p:nvSpPr>
         <p:spPr>
           <a:xfrm>
-            <a:off x="457200" y="1094346"/>
-            <a:ext cx="8229600" cy="5214974"/>
+            <a:off x="0" y="857232"/>
+            <a:ext cx="9144000" cy="6000768"/>
           </a:xfrm>
         </p:spPr>
         <p:txBody>
@@ -5254,7 +5292,7 @@
             </a:pPr>
             <a:r>
               <a:rPr lang="en-US" sz="2500" dirty="0"/>
-              <a:t>Lack of data</a:t>
+              <a:t>Lack of data and/or granularity (Confidentiality)</a:t>
             </a:r>
           </a:p>
           <a:p>
@@ -5263,6 +5301,60 @@
               <a:rPr lang="en-US" sz="2500" dirty="0"/>
               <a:t>Solution: </a:t>
             </a:r>
+          </a:p>
+          <a:p>
+            <a:pPr lvl="1"/>
+            <a:r>
+              <a:rPr lang="en-US" sz="2500" dirty="0"/>
+              <a:t> - Remove from the instance of dataset for a given year where the 70-90% of data is missing</a:t>
+            </a:r>
+          </a:p>
+          <a:p>
+            <a:pPr lvl="1"/>
+            <a:r>
+              <a:rPr lang="en-US" sz="2500" dirty="0"/>
+              <a:t> - Use a value  of sentinel values </a:t>
+            </a:r>
+          </a:p>
+          <a:p>
+            <a:pPr marL="800100" lvl="1" indent="-342900">
+              <a:buFont typeface="Arial" panose="020B0604020202020204" pitchFamily="34" charset="0"/>
+              <a:buChar char="•"/>
+            </a:pPr>
+            <a:r>
+              <a:rPr lang="en-US" sz="2500" dirty="0"/>
+              <a:t> Data redundancies (irrelevant rows or/and columns)</a:t>
+            </a:r>
+          </a:p>
+          <a:p>
+            <a:pPr marL="457200" lvl="1" indent="0"/>
+            <a:r>
+              <a:rPr lang="en-US" sz="2500" dirty="0"/>
+              <a:t>  Solution :</a:t>
+            </a:r>
+          </a:p>
+          <a:p>
+            <a:pPr marL="457200" lvl="1" indent="0"/>
+            <a:r>
+              <a:rPr lang="en-US" sz="2500" dirty="0"/>
+              <a:t> - Deletion</a:t>
+            </a:r>
+          </a:p>
+          <a:p>
+            <a:pPr lvl="1"/>
+            <a:endParaRPr lang="en-US" sz="2500" dirty="0"/>
+          </a:p>
+          <a:p>
+            <a:pPr lvl="1"/>
+            <a:endParaRPr lang="en-US" sz="2500" dirty="0"/>
+          </a:p>
+          <a:p>
+            <a:pPr marL="457200" lvl="1" indent="0"/>
+            <a:endParaRPr lang="en-US" sz="2500" dirty="0"/>
+          </a:p>
+          <a:p>
+            <a:pPr lvl="1"/>
+            <a:endParaRPr lang="en-US" sz="2500" dirty="0"/>
           </a:p>
           <a:p>
             <a:pPr marL="800100" lvl="1" indent="-342900">
@@ -5711,7 +5803,10 @@
           <a:bodyPr/>
           <a:lstStyle/>
           <a:p>
-            <a:endParaRPr lang="en-US"/>
+            <a:r>
+              <a:rPr lang="en-US" dirty="0"/>
+              <a:t>Mapping</a:t>
+            </a:r>
           </a:p>
         </p:txBody>
       </p:sp>
@@ -5731,81 +5826,37 @@
             <p:ph idx="1"/>
           </p:nvPr>
         </p:nvSpPr>
-        <p:spPr/>
+        <p:spPr>
+          <a:xfrm>
+            <a:off x="107504" y="857232"/>
+            <a:ext cx="9036496" cy="5812128"/>
+          </a:xfrm>
+        </p:spPr>
         <p:txBody>
           <a:bodyPr/>
           <a:lstStyle/>
           <a:p>
             <a:r>
-              <a:rPr lang="en-GB" dirty="0"/>
-              <a:t>Given the reading habits of each country, what is the level of literacy of this country comparing to other EU countries?</a:t>
-            </a:r>
-            <a:endParaRPr lang="pt-PT" dirty="0"/>
-          </a:p>
-          <a:p>
-            <a:r>
-              <a:rPr lang="en-US" dirty="0">
-                <a:highlight>
-                  <a:srgbClr val="FFFF00"/>
-                </a:highlight>
-              </a:rPr>
-              <a:t>(</a:t>
-            </a:r>
-            <a:r>
-              <a:rPr lang="en-US" dirty="0" err="1">
-                <a:highlight>
-                  <a:srgbClr val="FFFF00"/>
-                </a:highlight>
-              </a:rPr>
-              <a:t>nao</a:t>
-            </a:r>
-            <a:r>
-              <a:rPr lang="en-US" dirty="0">
-                <a:highlight>
-                  <a:srgbClr val="FFFF00"/>
-                </a:highlight>
-              </a:rPr>
-              <a:t> </a:t>
-            </a:r>
-            <a:r>
-              <a:rPr lang="en-US" dirty="0" err="1">
-                <a:highlight>
-                  <a:srgbClr val="FFFF00"/>
-                </a:highlight>
-              </a:rPr>
-              <a:t>temos</a:t>
-            </a:r>
-            <a:r>
-              <a:rPr lang="en-US" dirty="0">
-                <a:highlight>
-                  <a:srgbClr val="FFFF00"/>
-                </a:highlight>
-              </a:rPr>
-              <a:t> </a:t>
-            </a:r>
-            <a:r>
-              <a:rPr lang="en-US" dirty="0" err="1">
-                <a:highlight>
-                  <a:srgbClr val="FFFF00"/>
-                </a:highlight>
-              </a:rPr>
-              <a:t>este</a:t>
-            </a:r>
-            <a:r>
-              <a:rPr lang="en-US" dirty="0">
-                <a:highlight>
-                  <a:srgbClr val="FFFF00"/>
-                </a:highlight>
-              </a:rPr>
-              <a:t>)</a:t>
-            </a:r>
-          </a:p>
-          <a:p>
-            <a:r>
-              <a:rPr lang="en-GB" dirty="0"/>
-              <a:t>Given a country’s reading habits, what is the rate of dropout?</a:t>
-            </a:r>
-            <a:endParaRPr lang="pt-PT" dirty="0"/>
+              <a:rPr lang="en-GB" sz="2400" dirty="0"/>
+              <a:t>Given the reading habits of each country, what is the average income for education level comparing to other EU countries?</a:t>
+            </a:r>
+            <a:endParaRPr lang="pt-PT" sz="2400" dirty="0"/>
+          </a:p>
+          <a:p>
+            <a:endParaRPr lang="en-GB" dirty="0"/>
+          </a:p>
+          <a:p>
+            <a:endParaRPr lang="en-GB" sz="2600" dirty="0"/>
+          </a:p>
+          <a:p>
+            <a:endParaRPr lang="en-GB" sz="2600" dirty="0"/>
+          </a:p>
+          <a:p>
+            <a:r>
+              <a:rPr lang="en-GB" sz="2600" dirty="0"/>
+              <a:t>Given a country’s reading habits, what is the rate of dropout ?</a:t>
+            </a:r>
+            <a:endParaRPr lang="pt-PT" sz="2600" dirty="0"/>
           </a:p>
           <a:p>
             <a:endParaRPr lang="en-US" dirty="0"/>
@@ -5840,8 +5891,8 @@
         </p:blipFill>
         <p:spPr>
           <a:xfrm>
-            <a:off x="932384" y="5790079"/>
-            <a:ext cx="7279200" cy="489801"/>
+            <a:off x="932384" y="5781299"/>
+            <a:ext cx="7279200" cy="816053"/>
           </a:xfrm>
           <a:prstGeom prst="rect">
             <a:avLst/>
@@ -5876,8 +5927,44 @@
         </p:blipFill>
         <p:spPr>
           <a:xfrm>
-            <a:off x="932384" y="4753071"/>
+            <a:off x="932384" y="4629170"/>
             <a:ext cx="7279200" cy="816054"/>
+          </a:xfrm>
+          <a:prstGeom prst="rect">
+            <a:avLst/>
+          </a:prstGeom>
+        </p:spPr>
+      </p:pic>
+      <p:pic>
+        <p:nvPicPr>
+          <p:cNvPr id="6" name="Imagem 5">
+            <a:extLst>
+              <a:ext uri="{FF2B5EF4-FFF2-40B4-BE49-F238E27FC236}">
+                <a16:creationId xmlns:a16="http://schemas.microsoft.com/office/drawing/2014/main" id="{413F92D7-9386-436B-A97C-BB03FD120674}"/>
+              </a:ext>
+            </a:extLst>
+          </p:cNvPr>
+          <p:cNvPicPr>
+            <a:picLocks noChangeAspect="1"/>
+          </p:cNvPicPr>
+          <p:nvPr/>
+        </p:nvPicPr>
+        <p:blipFill>
+          <a:blip r:embed="rId4">
+            <a:extLst>
+              <a:ext uri="{28A0092B-C50C-407E-A947-70E740481C1C}">
+                <a14:useLocalDpi xmlns:a14="http://schemas.microsoft.com/office/drawing/2010/main" val="0"/>
+              </a:ext>
+            </a:extLst>
+          </a:blip>
+          <a:stretch>
+            <a:fillRect/>
+          </a:stretch>
+        </p:blipFill>
+        <p:spPr>
+          <a:xfrm>
+            <a:off x="323528" y="2247160"/>
+            <a:ext cx="8496944" cy="1037823"/>
           </a:xfrm>
           <a:prstGeom prst="rect">
             <a:avLst/>
@@ -5919,7 +6006,7 @@
           <p:cNvPr id="2" name="Título 1">
             <a:extLst>
               <a:ext uri="{FF2B5EF4-FFF2-40B4-BE49-F238E27FC236}">
-                <a16:creationId xmlns:a16="http://schemas.microsoft.com/office/drawing/2014/main" id="{ACB2D9AC-79F8-4DB0-8855-78D1CE555857}"/>
+                <a16:creationId xmlns:a16="http://schemas.microsoft.com/office/drawing/2014/main" id="{6D8F4238-C0CD-440B-88E5-4ACA21FEA2A6}"/>
               </a:ext>
             </a:extLst>
           </p:cNvPr>
@@ -5944,7 +6031,7 @@
           <p:cNvPr id="3" name="Marcador de Posição de Conteúdo 2">
             <a:extLst>
               <a:ext uri="{FF2B5EF4-FFF2-40B4-BE49-F238E27FC236}">
-                <a16:creationId xmlns:a16="http://schemas.microsoft.com/office/drawing/2014/main" id="{0D264FFD-1503-45FB-9CC5-C656EDB64C4C}"/>
+                <a16:creationId xmlns:a16="http://schemas.microsoft.com/office/drawing/2014/main" id="{B84D6E21-C229-4B1D-B523-FCC91E6721AF}"/>
               </a:ext>
             </a:extLst>
           </p:cNvPr>
@@ -5962,27 +6049,25 @@
           <a:p>
             <a:r>
               <a:rPr lang="en-GB" dirty="0"/>
-              <a:t>Is there a correlation between low habit of reading and the high academic success given a country?</a:t>
+              <a:t>What is the adult participation in learning after leaving the formal education?</a:t>
             </a:r>
             <a:endParaRPr lang="pt-PT" dirty="0"/>
           </a:p>
           <a:p>
-            <a:endParaRPr lang="en-US" dirty="0"/>
-          </a:p>
-          <a:p>
-            <a:endParaRPr lang="en-GB" dirty="0"/>
-          </a:p>
-          <a:p>
-            <a:endParaRPr lang="en-GB" dirty="0"/>
+            <a:endParaRPr lang="en-US" dirty="0">
+              <a:highlight>
+                <a:srgbClr val="FFFF00"/>
+              </a:highlight>
+            </a:endParaRPr>
           </a:p>
         </p:txBody>
       </p:sp>
       <p:pic>
         <p:nvPicPr>
-          <p:cNvPr id="5" name="Imagem 4" descr="Uma imagem com preto, sentado, vermelho, rua&#10;&#10;Descrição gerada automaticamente">
+          <p:cNvPr id="4" name="Imagem 3" descr="Uma imagem com preto, laranja, sentado, ecrã&#10;&#10;Descrição gerada automaticamente">
             <a:extLst>
               <a:ext uri="{FF2B5EF4-FFF2-40B4-BE49-F238E27FC236}">
-                <a16:creationId xmlns:a16="http://schemas.microsoft.com/office/drawing/2014/main" id="{A6EA04E5-1583-4033-A329-4AB6E71691EF}"/>
+                <a16:creationId xmlns:a16="http://schemas.microsoft.com/office/drawing/2014/main" id="{EA26DA27-FFC7-43CA-A1FB-0E68271194DD}"/>
               </a:ext>
             </a:extLst>
           </p:cNvPr>
@@ -6005,256 +6090,14 @@
         </p:blipFill>
         <p:spPr>
           <a:xfrm>
-            <a:off x="932384" y="2924944"/>
-            <a:ext cx="7279200" cy="816054"/>
+            <a:off x="611560" y="3212976"/>
+            <a:ext cx="7056784" cy="1512167"/>
           </a:xfrm>
           <a:prstGeom prst="rect">
             <a:avLst/>
           </a:prstGeom>
         </p:spPr>
       </p:pic>
-      <p:pic>
-        <p:nvPicPr>
-          <p:cNvPr id="7" name="Imagem 6" descr="Uma imagem com preto, laranja, sentado, ecrã&#10;&#10;Descrição gerada automaticamente">
-            <a:extLst>
-              <a:ext uri="{FF2B5EF4-FFF2-40B4-BE49-F238E27FC236}">
-                <a16:creationId xmlns:a16="http://schemas.microsoft.com/office/drawing/2014/main" id="{192C922D-0498-4998-9F43-DBC7BD7A2D2E}"/>
-              </a:ext>
-            </a:extLst>
-          </p:cNvPr>
-          <p:cNvPicPr>
-            <a:picLocks noChangeAspect="1"/>
-          </p:cNvPicPr>
-          <p:nvPr/>
-        </p:nvPicPr>
-        <p:blipFill>
-          <a:blip r:embed="rId3">
-            <a:extLst>
-              <a:ext uri="{28A0092B-C50C-407E-A947-70E740481C1C}">
-                <a14:useLocalDpi xmlns:a14="http://schemas.microsoft.com/office/drawing/2010/main" val="0"/>
-              </a:ext>
-            </a:extLst>
-          </a:blip>
-          <a:stretch>
-            <a:fillRect/>
-          </a:stretch>
-        </p:blipFill>
-        <p:spPr>
-          <a:xfrm>
-            <a:off x="931725" y="4005064"/>
-            <a:ext cx="7279200" cy="923011"/>
-          </a:xfrm>
-          <a:prstGeom prst="rect">
-            <a:avLst/>
-          </a:prstGeom>
-        </p:spPr>
-      </p:pic>
-    </p:spTree>
-    <p:extLst>
-      <p:ext uri="{BB962C8B-B14F-4D97-AF65-F5344CB8AC3E}">
-        <p14:creationId xmlns:p14="http://schemas.microsoft.com/office/powerpoint/2010/main" val="2538618161"/>
-      </p:ext>
-    </p:extLst>
-  </p:cSld>
-  <p:clrMapOvr>
-    <a:masterClrMapping/>
-  </p:clrMapOvr>
-</p:sld>
-</file>
-
-<file path=ppt/slides/slide22.xml><?xml version="1.0" encoding="utf-8"?>
-<p:sld xmlns:a="http://schemas.openxmlformats.org/drawingml/2006/main" xmlns:r="http://schemas.openxmlformats.org/officeDocument/2006/relationships" xmlns:p="http://schemas.openxmlformats.org/presentationml/2006/main">
-  <p:cSld>
-    <p:spTree>
-      <p:nvGrpSpPr>
-        <p:cNvPr id="1" name=""/>
-        <p:cNvGrpSpPr/>
-        <p:nvPr/>
-      </p:nvGrpSpPr>
-      <p:grpSpPr>
-        <a:xfrm>
-          <a:off x="0" y="0"/>
-          <a:ext cx="0" cy="0"/>
-          <a:chOff x="0" y="0"/>
-          <a:chExt cx="0" cy="0"/>
-        </a:xfrm>
-      </p:grpSpPr>
-      <p:sp>
-        <p:nvSpPr>
-          <p:cNvPr id="2" name="Título 1">
-            <a:extLst>
-              <a:ext uri="{FF2B5EF4-FFF2-40B4-BE49-F238E27FC236}">
-                <a16:creationId xmlns:a16="http://schemas.microsoft.com/office/drawing/2014/main" id="{6D8F4238-C0CD-440B-88E5-4ACA21FEA2A6}"/>
-              </a:ext>
-            </a:extLst>
-          </p:cNvPr>
-          <p:cNvSpPr>
-            <a:spLocks noGrp="1"/>
-          </p:cNvSpPr>
-          <p:nvPr>
-            <p:ph type="title"/>
-          </p:nvPr>
-        </p:nvSpPr>
-        <p:spPr/>
-        <p:txBody>
-          <a:bodyPr/>
-          <a:lstStyle/>
-          <a:p>
-            <a:endParaRPr lang="en-US"/>
-          </a:p>
-        </p:txBody>
-      </p:sp>
-      <p:sp>
-        <p:nvSpPr>
-          <p:cNvPr id="3" name="Marcador de Posição de Conteúdo 2">
-            <a:extLst>
-              <a:ext uri="{FF2B5EF4-FFF2-40B4-BE49-F238E27FC236}">
-                <a16:creationId xmlns:a16="http://schemas.microsoft.com/office/drawing/2014/main" id="{B84D6E21-C229-4B1D-B523-FCC91E6721AF}"/>
-              </a:ext>
-            </a:extLst>
-          </p:cNvPr>
-          <p:cNvSpPr>
-            <a:spLocks noGrp="1"/>
-          </p:cNvSpPr>
-          <p:nvPr>
-            <p:ph idx="1"/>
-          </p:nvPr>
-        </p:nvSpPr>
-        <p:spPr/>
-        <p:txBody>
-          <a:bodyPr/>
-          <a:lstStyle/>
-          <a:p>
-            <a:r>
-              <a:rPr lang="en-GB" dirty="0"/>
-              <a:t>What is the (under)achievement of students in reading, mathematics and science?</a:t>
-            </a:r>
-          </a:p>
-          <a:p>
-            <a:r>
-              <a:rPr lang="en-GB" dirty="0">
-                <a:highlight>
-                  <a:srgbClr val="FFFF00"/>
-                </a:highlight>
-              </a:rPr>
-              <a:t>(</a:t>
-            </a:r>
-            <a:r>
-              <a:rPr lang="en-GB" dirty="0" err="1">
-                <a:highlight>
-                  <a:srgbClr val="FFFF00"/>
-                </a:highlight>
-              </a:rPr>
-              <a:t>nao</a:t>
-            </a:r>
-            <a:r>
-              <a:rPr lang="en-GB" dirty="0">
-                <a:highlight>
-                  <a:srgbClr val="FFFF00"/>
-                </a:highlight>
-              </a:rPr>
-              <a:t> </a:t>
-            </a:r>
-            <a:r>
-              <a:rPr lang="en-GB" dirty="0" err="1">
-                <a:highlight>
-                  <a:srgbClr val="FFFF00"/>
-                </a:highlight>
-              </a:rPr>
-              <a:t>temos</a:t>
-            </a:r>
-            <a:r>
-              <a:rPr lang="en-GB" dirty="0">
-                <a:highlight>
-                  <a:srgbClr val="FFFF00"/>
-                </a:highlight>
-              </a:rPr>
-              <a:t> </a:t>
-            </a:r>
-            <a:r>
-              <a:rPr lang="en-GB" dirty="0" err="1">
-                <a:highlight>
-                  <a:srgbClr val="FFFF00"/>
-                </a:highlight>
-              </a:rPr>
-              <a:t>este</a:t>
-            </a:r>
-            <a:r>
-              <a:rPr lang="en-GB" dirty="0">
-                <a:highlight>
-                  <a:srgbClr val="FFFF00"/>
-                </a:highlight>
-              </a:rPr>
-              <a:t>)</a:t>
-            </a:r>
-          </a:p>
-          <a:p>
-            <a:r>
-              <a:rPr lang="en-GB" dirty="0"/>
-              <a:t>What is the adult participation in learning after leaving the formal education?</a:t>
-            </a:r>
-            <a:endParaRPr lang="pt-PT" dirty="0"/>
-          </a:p>
-          <a:p>
-            <a:r>
-              <a:rPr lang="en-US" dirty="0">
-                <a:highlight>
-                  <a:srgbClr val="FFFF00"/>
-                </a:highlight>
-              </a:rPr>
-              <a:t>(</a:t>
-            </a:r>
-            <a:r>
-              <a:rPr lang="en-US" dirty="0" err="1">
-                <a:highlight>
-                  <a:srgbClr val="FFFF00"/>
-                </a:highlight>
-              </a:rPr>
-              <a:t>nao</a:t>
-            </a:r>
-            <a:r>
-              <a:rPr lang="en-US" dirty="0">
-                <a:highlight>
-                  <a:srgbClr val="FFFF00"/>
-                </a:highlight>
-              </a:rPr>
-              <a:t> </a:t>
-            </a:r>
-            <a:r>
-              <a:rPr lang="en-US" dirty="0" err="1">
-                <a:highlight>
-                  <a:srgbClr val="FFFF00"/>
-                </a:highlight>
-              </a:rPr>
-              <a:t>temos</a:t>
-            </a:r>
-            <a:r>
-              <a:rPr lang="en-US" dirty="0">
-                <a:highlight>
-                  <a:srgbClr val="FFFF00"/>
-                </a:highlight>
-              </a:rPr>
-              <a:t> </a:t>
-            </a:r>
-            <a:r>
-              <a:rPr lang="en-US" dirty="0" err="1">
-                <a:highlight>
-                  <a:srgbClr val="FFFF00"/>
-                </a:highlight>
-              </a:rPr>
-              <a:t>este</a:t>
-            </a:r>
-            <a:r>
-              <a:rPr lang="en-US" dirty="0">
-                <a:highlight>
-                  <a:srgbClr val="FFFF00"/>
-                </a:highlight>
-              </a:rPr>
-              <a:t>)</a:t>
-            </a:r>
-          </a:p>
-        </p:txBody>
-      </p:sp>
     </p:spTree>
     <p:extLst>
       <p:ext uri="{BB962C8B-B14F-4D97-AF65-F5344CB8AC3E}">
@@ -6268,7 +6111,7 @@
 </p:sld>
 </file>
 
-<file path=ppt/slides/slide23.xml><?xml version="1.0" encoding="utf-8"?>
+<file path=ppt/slides/slide22.xml><?xml version="1.0" encoding="utf-8"?>
 <p:sld xmlns:a="http://schemas.openxmlformats.org/drawingml/2006/main" xmlns:r="http://schemas.openxmlformats.org/officeDocument/2006/relationships" xmlns:p="http://schemas.openxmlformats.org/presentationml/2006/main">
   <p:cSld>
     <p:spTree>
@@ -6446,7 +6289,7 @@
               <a:buChar char="•"/>
             </a:pPr>
             <a:r>
-              <a:rPr lang="en-US" sz="2500" dirty="0"/>
+              <a:rPr lang="en-US" sz="2500" b="1" dirty="0"/>
               <a:t>Early leavers from education</a:t>
             </a:r>
           </a:p>
@@ -6617,7 +6460,7 @@
               <a:buChar char="•"/>
             </a:pPr>
             <a:r>
-              <a:rPr lang="en-US" sz="2500" dirty="0"/>
+              <a:rPr lang="en-US" sz="2500" b="1" dirty="0"/>
               <a:t>Average income by education level</a:t>
             </a:r>
           </a:p>
@@ -6648,7 +6491,7 @@
               <a:buChar char="•"/>
             </a:pPr>
             <a:r>
-              <a:rPr lang="en-US" sz="2500" dirty="0"/>
+              <a:rPr lang="en-US" sz="2500" b="1" dirty="0"/>
               <a:t>Share of household expense in books/ reading material</a:t>
             </a:r>
           </a:p>
@@ -6806,8 +6649,8 @@
         </p:nvSpPr>
         <p:spPr>
           <a:xfrm>
-            <a:off x="457200" y="1285860"/>
-            <a:ext cx="8229600" cy="5214974"/>
+            <a:off x="457200" y="857232"/>
+            <a:ext cx="8229600" cy="5643602"/>
           </a:xfrm>
         </p:spPr>
         <p:txBody>
@@ -6821,19 +6664,19 @@
               <a:buChar char="•"/>
             </a:pPr>
             <a:r>
-              <a:rPr lang="pt-PT" sz="2500" dirty="0" err="1"/>
+              <a:rPr lang="pt-PT" sz="2500" b="1" dirty="0" err="1"/>
               <a:t>Average</a:t>
             </a:r>
             <a:r>
-              <a:rPr lang="pt-PT" sz="2500" dirty="0"/>
+              <a:rPr lang="pt-PT" sz="2500" b="1" dirty="0"/>
               <a:t> time </a:t>
             </a:r>
             <a:r>
-              <a:rPr lang="pt-PT" sz="2500" dirty="0" err="1"/>
+              <a:rPr lang="pt-PT" sz="2500" b="1" dirty="0" err="1"/>
               <a:t>spent</a:t>
             </a:r>
             <a:r>
-              <a:rPr lang="pt-PT" sz="2500" dirty="0"/>
+              <a:rPr lang="pt-PT" sz="2500" b="1" dirty="0"/>
               <a:t> Reading</a:t>
             </a:r>
           </a:p>
@@ -6859,39 +6702,36 @@
             <a:endParaRPr lang="pt-PT" sz="2100" dirty="0"/>
           </a:p>
           <a:p>
-            <a:pPr lvl="1">
+            <a:pPr marL="457200" lvl="1" indent="0"/>
+            <a:endParaRPr lang="pt-PT" sz="2100" dirty="0"/>
+          </a:p>
+          <a:p>
+            <a:pPr marL="800100" lvl="1" indent="-342900">
               <a:buFont typeface="Arial" panose="020B0604020202020204" pitchFamily="34" charset="0"/>
               <a:buChar char="•"/>
             </a:pPr>
-            <a:endParaRPr lang="pt-PT" sz="2100" dirty="0"/>
-          </a:p>
-          <a:p>
-            <a:pPr lvl="1">
-              <a:buFont typeface="Arial" panose="020B0604020202020204" pitchFamily="34" charset="0"/>
-              <a:buChar char="•"/>
-            </a:pPr>
-            <a:r>
-              <a:rPr lang="pt-PT" sz="2500" dirty="0" err="1"/>
+            <a:r>
+              <a:rPr lang="pt-PT" sz="2500" b="1" dirty="0" err="1"/>
               <a:t>Participation</a:t>
             </a:r>
             <a:r>
-              <a:rPr lang="pt-PT" sz="2500" dirty="0"/>
+              <a:rPr lang="pt-PT" sz="2500" b="1" dirty="0"/>
               <a:t> rate in </a:t>
             </a:r>
             <a:r>
-              <a:rPr lang="pt-PT" sz="2500" dirty="0" err="1"/>
+              <a:rPr lang="pt-PT" sz="2500" b="1" dirty="0" err="1"/>
               <a:t>education</a:t>
             </a:r>
             <a:r>
-              <a:rPr lang="pt-PT" sz="2500" dirty="0"/>
+              <a:rPr lang="pt-PT" sz="2500" b="1" dirty="0"/>
               <a:t> </a:t>
             </a:r>
             <a:r>
-              <a:rPr lang="pt-PT" sz="2500" dirty="0" err="1"/>
+              <a:rPr lang="pt-PT" sz="2500" b="1" dirty="0" err="1"/>
               <a:t>and</a:t>
             </a:r>
             <a:r>
-              <a:rPr lang="pt-PT" sz="2500" dirty="0"/>
+              <a:rPr lang="pt-PT" sz="2500" b="1" dirty="0"/>
               <a:t> training</a:t>
             </a:r>
           </a:p>
@@ -6932,7 +6772,7 @@
         </p:blipFill>
         <p:spPr>
           <a:xfrm>
-            <a:off x="924417" y="1859721"/>
+            <a:off x="924417" y="1412776"/>
             <a:ext cx="7279200" cy="1122309"/>
           </a:xfrm>
           <a:prstGeom prst="rect">
@@ -6968,7 +6808,7 @@
         </p:blipFill>
         <p:spPr>
           <a:xfrm>
-            <a:off x="924417" y="4005064"/>
+            <a:off x="924417" y="3457114"/>
             <a:ext cx="7279200" cy="1060845"/>
           </a:xfrm>
           <a:prstGeom prst="rect">

</xml_diff>